<commit_message>
W2D5 & D6 Final
</commit_message>
<xml_diff>
--- a/Week_2/Day_4/Miniproject 2.pptx
+++ b/Week_2/Day_4/Miniproject 2.pptx
@@ -5,7 +5,7 @@
     <p:sldMasterId id="2147483660" r:id="rId1"/>
   </p:sldMasterIdLst>
   <p:notesMasterIdLst>
-    <p:notesMasterId r:id="rId12"/>
+    <p:notesMasterId r:id="rId11"/>
   </p:notesMasterIdLst>
   <p:sldIdLst>
     <p:sldId id="256" r:id="rId2"/>
@@ -13,11 +13,10 @@
     <p:sldId id="260" r:id="rId4"/>
     <p:sldId id="265" r:id="rId5"/>
     <p:sldId id="258" r:id="rId6"/>
-    <p:sldId id="266" r:id="rId7"/>
-    <p:sldId id="259" r:id="rId8"/>
-    <p:sldId id="269" r:id="rId9"/>
-    <p:sldId id="268" r:id="rId10"/>
-    <p:sldId id="264" r:id="rId11"/>
+    <p:sldId id="259" r:id="rId7"/>
+    <p:sldId id="269" r:id="rId8"/>
+    <p:sldId id="268" r:id="rId9"/>
+    <p:sldId id="264" r:id="rId10"/>
   </p:sldIdLst>
   <p:sldSz cx="12192000" cy="6858000"/>
   <p:notesSz cx="6858000" cy="9144000"/>
@@ -206,7 +205,7 @@
           <a:p>
             <a:fld id="{81A8A069-BA3D-46A6-8556-56944FDB635F}" type="datetimeFigureOut">
               <a:rPr lang="en-CA" smtClean="0"/>
-              <a:t>7/29/2021</a:t>
+              <a:t>7/30/2021</a:t>
             </a:fld>
             <a:endParaRPr lang="en-CA"/>
           </a:p>
@@ -518,6 +517,86 @@
           <a:bodyPr/>
           <a:lstStyle/>
           <a:p>
+            <a:r>
+              <a:rPr lang="en-CA" dirty="0"/>
+              <a:t>Anurag’s comments:</a:t>
+            </a:r>
+          </a:p>
+          <a:p>
+            <a:pPr marL="171450" indent="-171450">
+              <a:buFontTx/>
+              <a:buChar char="-"/>
+            </a:pPr>
+            <a:r>
+              <a:rPr lang="en-CA" dirty="0"/>
+              <a:t>Real-life data science projects typically are</a:t>
+            </a:r>
+            <a:r>
+              <a:rPr lang="en-CA" baseline="0" dirty="0"/>
+              <a:t> at least 3 months</a:t>
+            </a:r>
+          </a:p>
+          <a:p>
+            <a:pPr marL="171450" indent="-171450">
+              <a:buFontTx/>
+              <a:buChar char="-"/>
+            </a:pPr>
+            <a:r>
+              <a:rPr lang="en-CA" baseline="0" dirty="0"/>
+              <a:t>No code at all, or screenshots from </a:t>
+            </a:r>
+            <a:r>
+              <a:rPr lang="en-CA" baseline="0" dirty="0" err="1"/>
+              <a:t>Jupyter</a:t>
+            </a:r>
+            <a:r>
+              <a:rPr lang="en-CA" baseline="0" dirty="0"/>
+              <a:t> labs</a:t>
+            </a:r>
+          </a:p>
+          <a:p>
+            <a:pPr marL="171450" indent="-171450">
+              <a:buFontTx/>
+              <a:buChar char="-"/>
+            </a:pPr>
+            <a:r>
+              <a:rPr lang="en-CA" baseline="0" dirty="0"/>
+              <a:t>Don’t make your audience work for your visualizations</a:t>
+            </a:r>
+          </a:p>
+          <a:p>
+            <a:pPr marL="171450" indent="-171450">
+              <a:buFontTx/>
+              <a:buChar char="-"/>
+            </a:pPr>
+            <a:r>
+              <a:rPr lang="en-CA" baseline="0" dirty="0"/>
+              <a:t>Evaluate presentation from this perspective: “you are an owner of a company, and somebody presents you this presentation”.</a:t>
+            </a:r>
+          </a:p>
+          <a:p>
+            <a:pPr marL="171450" indent="-171450">
+              <a:buFontTx/>
+              <a:buChar char="-"/>
+            </a:pPr>
+            <a:r>
+              <a:rPr lang="en-CA" baseline="0" dirty="0"/>
+              <a:t>Focus on the big picture and the business problems you are solving. (How does the business earn money?)</a:t>
+            </a:r>
+          </a:p>
+          <a:p>
+            <a:pPr marL="171450" indent="-171450">
+              <a:buFontTx/>
+              <a:buChar char="-"/>
+            </a:pPr>
+            <a:r>
+              <a:rPr lang="en-CA" baseline="0" dirty="0"/>
+              <a:t>Practice talking to non-technical audience (how to explain API to a </a:t>
+            </a:r>
+            <a:r>
+              <a:rPr lang="en-CA" baseline="0"/>
+              <a:t>5 year-old)</a:t>
+            </a:r>
             <a:endParaRPr lang="en-CA" dirty="0"/>
           </a:p>
         </p:txBody>
@@ -822,9 +901,23 @@
           <a:bodyPr/>
           <a:lstStyle/>
           <a:p>
+            <a:pPr marL="171450" indent="-171450">
+              <a:buFontTx/>
+              <a:buChar char="-"/>
+            </a:pPr>
             <a:r>
               <a:rPr lang="en-CA" baseline="0" dirty="0"/>
-              <a:t>- Six common venues (Target and Ralphs were obtained multiple times in Foursquare query).</a:t>
+              <a:t>Six common venues (Target and Ralphs were obtained multiple times in Foursquare query).</a:t>
+            </a:r>
+          </a:p>
+          <a:p>
+            <a:pPr marL="171450" indent="-171450">
+              <a:buFontTx/>
+              <a:buChar char="-"/>
+            </a:pPr>
+            <a:r>
+              <a:rPr lang="en-CA" baseline="0" dirty="0"/>
+              <a:t>Insight: only 12.5% of the search results were common between both APIs</a:t>
             </a:r>
             <a:endParaRPr lang="en-CA" dirty="0"/>
           </a:p>
@@ -847,7 +940,7 @@
           <a:p>
             <a:fld id="{188F1977-5685-4D41-84BF-DDDC42B2FD8A}" type="slidenum">
               <a:rPr lang="en-CA" smtClean="0"/>
-              <a:t>7</a:t>
+              <a:t>6</a:t>
             </a:fld>
             <a:endParaRPr lang="en-CA"/>
           </a:p>
@@ -916,49 +1009,8 @@
             </a:pPr>
             <a:r>
               <a:rPr lang="en-CA" baseline="0" dirty="0"/>
-              <a:t>Sorted by review count and likes respectively</a:t>
-            </a:r>
-          </a:p>
-          <a:p>
-            <a:pPr marL="171450" indent="-171450">
-              <a:buFontTx/>
-              <a:buChar char="-"/>
-            </a:pPr>
-            <a:r>
-              <a:rPr lang="en-CA" baseline="0" dirty="0"/>
-              <a:t>Three common venues in top 10</a:t>
-            </a:r>
-          </a:p>
-          <a:p>
-            <a:pPr marL="171450" indent="-171450">
-              <a:buFontTx/>
-              <a:buChar char="-"/>
-            </a:pPr>
-            <a:r>
-              <a:rPr lang="en-CA" baseline="0" dirty="0"/>
-              <a:t>One additional venue is common but has slightly different name</a:t>
-            </a:r>
-          </a:p>
-          <a:p>
-            <a:pPr marL="171450" indent="-171450">
-              <a:buFontTx/>
-              <a:buChar char="-"/>
-            </a:pPr>
-            <a:r>
-              <a:rPr lang="en-CA" baseline="0" dirty="0"/>
-              <a:t>Remaining common venues are not shared in top 10</a:t>
-            </a:r>
-          </a:p>
-          <a:p>
-            <a:pPr marL="171450" indent="-171450">
-              <a:buFontTx/>
-              <a:buChar char="-"/>
-            </a:pPr>
-            <a:r>
-              <a:rPr lang="en-CA" baseline="0" dirty="0"/>
-              <a:t>Key insights: search algorithms return similar results</a:t>
-            </a:r>
-            <a:endParaRPr lang="en-CA" dirty="0"/>
+              <a:t>Insight: search algorithms return much similar results for top 10 (40% compared to 12.5%)</a:t>
+            </a:r>
           </a:p>
         </p:txBody>
       </p:sp>
@@ -979,7 +1031,7 @@
           <a:p>
             <a:fld id="{188F1977-5685-4D41-84BF-DDDC42B2FD8A}" type="slidenum">
               <a:rPr lang="en-CA" smtClean="0"/>
-              <a:t>8</a:t>
+              <a:t>7</a:t>
             </a:fld>
             <a:endParaRPr lang="en-CA"/>
           </a:p>
@@ -1142,7 +1194,7 @@
           <a:p>
             <a:fld id="{188F1977-5685-4D41-84BF-DDDC42B2FD8A}" type="slidenum">
               <a:rPr lang="en-CA" smtClean="0"/>
-              <a:t>9</a:t>
+              <a:t>8</a:t>
             </a:fld>
             <a:endParaRPr lang="en-CA"/>
           </a:p>
@@ -1229,7 +1281,7 @@
           <a:p>
             <a:fld id="{188F1977-5685-4D41-84BF-DDDC42B2FD8A}" type="slidenum">
               <a:rPr lang="en-CA" smtClean="0"/>
-              <a:t>10</a:t>
+              <a:t>9</a:t>
             </a:fld>
             <a:endParaRPr lang="en-CA"/>
           </a:p>
@@ -1750,7 +1802,7 @@
           <a:p>
             <a:fld id="{52A40D1F-8DC8-452B-B505-1D78AF183F5D}" type="datetimeFigureOut">
               <a:rPr lang="en-CA" smtClean="0"/>
-              <a:t>7/29/2021</a:t>
+              <a:t>7/30/2021</a:t>
             </a:fld>
             <a:endParaRPr lang="en-CA"/>
           </a:p>
@@ -2046,7 +2098,7 @@
           <a:p>
             <a:fld id="{52A40D1F-8DC8-452B-B505-1D78AF183F5D}" type="datetimeFigureOut">
               <a:rPr lang="en-CA" smtClean="0"/>
-              <a:t>7/29/2021</a:t>
+              <a:t>7/30/2021</a:t>
             </a:fld>
             <a:endParaRPr lang="en-CA"/>
           </a:p>
@@ -2294,7 +2346,7 @@
           <a:p>
             <a:fld id="{52A40D1F-8DC8-452B-B505-1D78AF183F5D}" type="datetimeFigureOut">
               <a:rPr lang="en-CA" smtClean="0"/>
-              <a:t>7/29/2021</a:t>
+              <a:t>7/30/2021</a:t>
             </a:fld>
             <a:endParaRPr lang="en-CA"/>
           </a:p>
@@ -2834,7 +2886,7 @@
           <a:p>
             <a:fld id="{52A40D1F-8DC8-452B-B505-1D78AF183F5D}" type="datetimeFigureOut">
               <a:rPr lang="en-CA" smtClean="0"/>
-              <a:t>7/29/2021</a:t>
+              <a:t>7/30/2021</a:t>
             </a:fld>
             <a:endParaRPr lang="en-CA"/>
           </a:p>
@@ -3082,7 +3134,7 @@
           <a:p>
             <a:fld id="{52A40D1F-8DC8-452B-B505-1D78AF183F5D}" type="datetimeFigureOut">
               <a:rPr lang="en-CA" smtClean="0"/>
-              <a:t>7/29/2021</a:t>
+              <a:t>7/30/2021</a:t>
             </a:fld>
             <a:endParaRPr lang="en-CA"/>
           </a:p>
@@ -3614,7 +3666,7 @@
           <a:p>
             <a:fld id="{52A40D1F-8DC8-452B-B505-1D78AF183F5D}" type="datetimeFigureOut">
               <a:rPr lang="en-CA" smtClean="0"/>
-              <a:t>7/29/2021</a:t>
+              <a:t>7/30/2021</a:t>
             </a:fld>
             <a:endParaRPr lang="en-CA"/>
           </a:p>
@@ -3911,7 +3963,7 @@
           <a:p>
             <a:fld id="{52A40D1F-8DC8-452B-B505-1D78AF183F5D}" type="datetimeFigureOut">
               <a:rPr lang="en-CA" smtClean="0"/>
-              <a:t>7/29/2021</a:t>
+              <a:t>7/30/2021</a:t>
             </a:fld>
             <a:endParaRPr lang="en-CA"/>
           </a:p>
@@ -4085,7 +4137,7 @@
           <a:p>
             <a:fld id="{52A40D1F-8DC8-452B-B505-1D78AF183F5D}" type="datetimeFigureOut">
               <a:rPr lang="en-CA" smtClean="0"/>
-              <a:t>7/29/2021</a:t>
+              <a:t>7/30/2021</a:t>
             </a:fld>
             <a:endParaRPr lang="en-CA"/>
           </a:p>
@@ -4265,7 +4317,7 @@
           <a:p>
             <a:fld id="{52A40D1F-8DC8-452B-B505-1D78AF183F5D}" type="datetimeFigureOut">
               <a:rPr lang="en-CA" smtClean="0"/>
-              <a:t>7/29/2021</a:t>
+              <a:t>7/30/2021</a:t>
             </a:fld>
             <a:endParaRPr lang="en-CA"/>
           </a:p>
@@ -4435,7 +4487,7 @@
           <a:p>
             <a:fld id="{52A40D1F-8DC8-452B-B505-1D78AF183F5D}" type="datetimeFigureOut">
               <a:rPr lang="en-CA" smtClean="0"/>
-              <a:t>7/29/2021</a:t>
+              <a:t>7/30/2021</a:t>
             </a:fld>
             <a:endParaRPr lang="en-CA"/>
           </a:p>
@@ -4686,7 +4738,7 @@
           <a:p>
             <a:fld id="{52A40D1F-8DC8-452B-B505-1D78AF183F5D}" type="datetimeFigureOut">
               <a:rPr lang="en-CA" smtClean="0"/>
-              <a:t>7/29/2021</a:t>
+              <a:t>7/30/2021</a:t>
             </a:fld>
             <a:endParaRPr lang="en-CA"/>
           </a:p>
@@ -4983,7 +5035,7 @@
           <a:p>
             <a:fld id="{52A40D1F-8DC8-452B-B505-1D78AF183F5D}" type="datetimeFigureOut">
               <a:rPr lang="en-CA" smtClean="0"/>
-              <a:t>7/29/2021</a:t>
+              <a:t>7/30/2021</a:t>
             </a:fld>
             <a:endParaRPr lang="en-CA"/>
           </a:p>
@@ -5425,7 +5477,7 @@
           <a:p>
             <a:fld id="{52A40D1F-8DC8-452B-B505-1D78AF183F5D}" type="datetimeFigureOut">
               <a:rPr lang="en-CA" smtClean="0"/>
-              <a:t>7/29/2021</a:t>
+              <a:t>7/30/2021</a:t>
             </a:fld>
             <a:endParaRPr lang="en-CA"/>
           </a:p>
@@ -5543,7 +5595,7 @@
           <a:p>
             <a:fld id="{52A40D1F-8DC8-452B-B505-1D78AF183F5D}" type="datetimeFigureOut">
               <a:rPr lang="en-CA" smtClean="0"/>
-              <a:t>7/29/2021</a:t>
+              <a:t>7/30/2021</a:t>
             </a:fld>
             <a:endParaRPr lang="en-CA"/>
           </a:p>
@@ -5638,7 +5690,7 @@
           <a:p>
             <a:fld id="{52A40D1F-8DC8-452B-B505-1D78AF183F5D}" type="datetimeFigureOut">
               <a:rPr lang="en-CA" smtClean="0"/>
-              <a:t>7/29/2021</a:t>
+              <a:t>7/30/2021</a:t>
             </a:fld>
             <a:endParaRPr lang="en-CA"/>
           </a:p>
@@ -5921,7 +5973,7 @@
           <a:p>
             <a:fld id="{52A40D1F-8DC8-452B-B505-1D78AF183F5D}" type="datetimeFigureOut">
               <a:rPr lang="en-CA" smtClean="0"/>
-              <a:t>7/29/2021</a:t>
+              <a:t>7/30/2021</a:t>
             </a:fld>
             <a:endParaRPr lang="en-CA"/>
           </a:p>
@@ -6212,7 +6264,7 @@
           <a:p>
             <a:fld id="{52A40D1F-8DC8-452B-B505-1D78AF183F5D}" type="datetimeFigureOut">
               <a:rPr lang="en-CA" smtClean="0"/>
-              <a:t>7/29/2021</a:t>
+              <a:t>7/30/2021</a:t>
             </a:fld>
             <a:endParaRPr lang="en-CA"/>
           </a:p>
@@ -6742,7 +6794,7 @@
           <a:p>
             <a:fld id="{52A40D1F-8DC8-452B-B505-1D78AF183F5D}" type="datetimeFigureOut">
               <a:rPr lang="en-CA" smtClean="0"/>
-              <a:t>7/29/2021</a:t>
+              <a:t>7/30/2021</a:t>
             </a:fld>
             <a:endParaRPr lang="en-CA"/>
           </a:p>
@@ -7352,235 +7404,6 @@
 </p:sld>
 </file>
 
-<file path=ppt/slides/slide10.xml><?xml version="1.0" encoding="utf-8"?>
-<p:sld xmlns:a="http://schemas.openxmlformats.org/drawingml/2006/main" xmlns:r="http://schemas.openxmlformats.org/officeDocument/2006/relationships" xmlns:p="http://schemas.openxmlformats.org/presentationml/2006/main">
-  <p:cSld>
-    <p:spTree>
-      <p:nvGrpSpPr>
-        <p:cNvPr id="1" name=""/>
-        <p:cNvGrpSpPr/>
-        <p:nvPr/>
-      </p:nvGrpSpPr>
-      <p:grpSpPr>
-        <a:xfrm>
-          <a:off x="0" y="0"/>
-          <a:ext cx="0" cy="0"/>
-          <a:chOff x="0" y="0"/>
-          <a:chExt cx="0" cy="0"/>
-        </a:xfrm>
-      </p:grpSpPr>
-      <p:sp>
-        <p:nvSpPr>
-          <p:cNvPr id="2" name="Title 1"/>
-          <p:cNvSpPr>
-            <a:spLocks noGrp="1"/>
-          </p:cNvSpPr>
-          <p:nvPr>
-            <p:ph type="title"/>
-          </p:nvPr>
-        </p:nvSpPr>
-        <p:spPr>
-          <a:xfrm>
-            <a:off x="1484311" y="0"/>
-            <a:ext cx="10018713" cy="1752599"/>
-          </a:xfrm>
-        </p:spPr>
-        <p:txBody>
-          <a:bodyPr>
-            <a:normAutofit/>
-          </a:bodyPr>
-          <a:lstStyle/>
-          <a:p>
-            <a:r>
-              <a:rPr lang="en-CA" sz="5400" dirty="0"/>
-              <a:t>Challenges</a:t>
-            </a:r>
-          </a:p>
-        </p:txBody>
-      </p:sp>
-      <p:sp>
-        <p:nvSpPr>
-          <p:cNvPr id="8" name="Content Placeholder 7"/>
-          <p:cNvSpPr>
-            <a:spLocks noGrp="1"/>
-          </p:cNvSpPr>
-          <p:nvPr>
-            <p:ph idx="1"/>
-          </p:nvPr>
-        </p:nvSpPr>
-        <p:spPr>
-          <a:xfrm>
-            <a:off x="1484310" y="1752599"/>
-            <a:ext cx="10018713" cy="3863332"/>
-          </a:xfrm>
-        </p:spPr>
-        <p:txBody>
-          <a:bodyPr anchor="t">
-            <a:normAutofit/>
-          </a:bodyPr>
-          <a:lstStyle/>
-          <a:p>
-            <a:r>
-              <a:rPr lang="en-CA" sz="3600" dirty="0"/>
-              <a:t>Manipulating </a:t>
-            </a:r>
-            <a:r>
-              <a:rPr lang="en-CA" sz="3600" dirty="0" err="1"/>
-              <a:t>dataframes</a:t>
-            </a:r>
-            <a:endParaRPr lang="en-CA" sz="3600" dirty="0"/>
-          </a:p>
-          <a:p>
-            <a:pPr marL="0" indent="0">
-              <a:buNone/>
-            </a:pPr>
-            <a:endParaRPr lang="en-CA" sz="3600" dirty="0"/>
-          </a:p>
-          <a:p>
-            <a:r>
-              <a:rPr lang="en-CA" sz="3600" dirty="0"/>
-              <a:t>Splitting up categories</a:t>
-            </a:r>
-          </a:p>
-          <a:p>
-            <a:endParaRPr lang="en-CA" sz="3600" dirty="0"/>
-          </a:p>
-          <a:p>
-            <a:r>
-              <a:rPr lang="en-CA" sz="3600" dirty="0"/>
-              <a:t>Watching for typos (API query parameters)</a:t>
-            </a:r>
-          </a:p>
-          <a:p>
-            <a:endParaRPr lang="en-CA" sz="3600" dirty="0"/>
-          </a:p>
-        </p:txBody>
-      </p:sp>
-      <p:pic>
-        <p:nvPicPr>
-          <p:cNvPr id="6146" name="Picture 2" descr="https://clipground.com/images/confused-emoji-png-15.png"/>
-          <p:cNvPicPr>
-            <a:picLocks noChangeAspect="1" noChangeArrowheads="1"/>
-          </p:cNvPicPr>
-          <p:nvPr/>
-        </p:nvPicPr>
-        <p:blipFill>
-          <a:blip r:embed="rId3">
-            <a:extLst>
-              <a:ext uri="{28A0092B-C50C-407E-A947-70E740481C1C}">
-                <a14:useLocalDpi xmlns:a14="http://schemas.microsoft.com/office/drawing/2010/main" val="0"/>
-              </a:ext>
-            </a:extLst>
-          </a:blip>
-          <a:srcRect/>
-          <a:stretch>
-            <a:fillRect/>
-          </a:stretch>
-        </p:blipFill>
-        <p:spPr bwMode="auto">
-          <a:xfrm>
-            <a:off x="10604314" y="5615931"/>
-            <a:ext cx="1013468" cy="1013468"/>
-          </a:xfrm>
-          <a:prstGeom prst="rect">
-            <a:avLst/>
-          </a:prstGeom>
-          <a:noFill/>
-          <a:extLst>
-            <a:ext uri="{909E8E84-426E-40DD-AFC4-6F175D3DCCD1}">
-              <a14:hiddenFill xmlns:a14="http://schemas.microsoft.com/office/drawing/2010/main">
-                <a:solidFill>
-                  <a:srgbClr val="FFFFFF"/>
-                </a:solidFill>
-              </a14:hiddenFill>
-            </a:ext>
-          </a:extLst>
-        </p:spPr>
-      </p:pic>
-      <p:pic>
-        <p:nvPicPr>
-          <p:cNvPr id="5" name="Picture 6" descr="http://3.bp.blogspot.com/-tpjq61VsB8M/VDmrkLCMbyI/AAAAAAAAFeQ/c5yC893C9fg/s0/Logo%2BYelp.png"/>
-          <p:cNvPicPr>
-            <a:picLocks noChangeAspect="1" noChangeArrowheads="1"/>
-          </p:cNvPicPr>
-          <p:nvPr/>
-        </p:nvPicPr>
-        <p:blipFill>
-          <a:blip r:embed="rId4">
-            <a:extLst>
-              <a:ext uri="{28A0092B-C50C-407E-A947-70E740481C1C}">
-                <a14:useLocalDpi xmlns:a14="http://schemas.microsoft.com/office/drawing/2010/main" val="0"/>
-              </a:ext>
-            </a:extLst>
-          </a:blip>
-          <a:srcRect/>
-          <a:stretch>
-            <a:fillRect/>
-          </a:stretch>
-        </p:blipFill>
-        <p:spPr bwMode="auto">
-          <a:xfrm>
-            <a:off x="9685620" y="88609"/>
-            <a:ext cx="1036320" cy="691269"/>
-          </a:xfrm>
-          <a:prstGeom prst="rect">
-            <a:avLst/>
-          </a:prstGeom>
-          <a:noFill/>
-          <a:extLst>
-            <a:ext uri="{909E8E84-426E-40DD-AFC4-6F175D3DCCD1}">
-              <a14:hiddenFill xmlns:a14="http://schemas.microsoft.com/office/drawing/2010/main">
-                <a:solidFill>
-                  <a:srgbClr val="FFFFFF"/>
-                </a:solidFill>
-              </a14:hiddenFill>
-            </a:ext>
-          </a:extLst>
-        </p:spPr>
-      </p:pic>
-      <p:pic>
-        <p:nvPicPr>
-          <p:cNvPr id="6" name="Picture 5"/>
-          <p:cNvPicPr>
-            <a:picLocks noChangeAspect="1"/>
-          </p:cNvPicPr>
-          <p:nvPr/>
-        </p:nvPicPr>
-        <p:blipFill>
-          <a:blip r:embed="rId5">
-            <a:extLst>
-              <a:ext uri="{28A0092B-C50C-407E-A947-70E740481C1C}">
-                <a14:useLocalDpi xmlns:a14="http://schemas.microsoft.com/office/drawing/2010/main" val="0"/>
-              </a:ext>
-            </a:extLst>
-          </a:blip>
-          <a:stretch>
-            <a:fillRect/>
-          </a:stretch>
-        </p:blipFill>
-        <p:spPr>
-          <a:xfrm>
-            <a:off x="10721940" y="340941"/>
-            <a:ext cx="1418308" cy="237252"/>
-          </a:xfrm>
-          <a:prstGeom prst="rect">
-            <a:avLst/>
-          </a:prstGeom>
-        </p:spPr>
-      </p:pic>
-    </p:spTree>
-    <p:extLst>
-      <p:ext uri="{BB962C8B-B14F-4D97-AF65-F5344CB8AC3E}">
-        <p14:creationId xmlns:p14="http://schemas.microsoft.com/office/powerpoint/2010/main" val="1960209316"/>
-      </p:ext>
-    </p:extLst>
-  </p:cSld>
-  <p:clrMapOvr>
-    <a:masterClrMapping/>
-  </p:clrMapOvr>
-</p:sld>
-</file>
-
 <file path=ppt/slides/slide2.xml><?xml version="1.0" encoding="utf-8"?>
 <p:sld xmlns:a="http://schemas.openxmlformats.org/drawingml/2006/main" xmlns:r="http://schemas.openxmlformats.org/officeDocument/2006/relationships" xmlns:p="http://schemas.openxmlformats.org/presentationml/2006/main">
   <p:cSld>
@@ -7896,7 +7719,7 @@
         <p:spPr>
           <a:xfrm>
             <a:off x="3985593" y="1472252"/>
-            <a:ext cx="5016147" cy="523220"/>
+            <a:ext cx="5016147" cy="954107"/>
           </a:xfrm>
           <a:prstGeom prst="rect">
             <a:avLst/>
@@ -7912,7 +7735,7 @@
             <a:pPr algn="ctr"/>
             <a:r>
               <a:rPr lang="en-CA" sz="2800" i="1" dirty="0"/>
-              <a:t>Compare yelp &amp; Foursquare APIs</a:t>
+              <a:t>Find the best things to do in Hollywood</a:t>
             </a:r>
           </a:p>
         </p:txBody>
@@ -8075,8 +7898,8 @@
         </p:blipFill>
         <p:spPr bwMode="auto">
           <a:xfrm>
-            <a:off x="9685620" y="88609"/>
-            <a:ext cx="1036320" cy="691269"/>
+            <a:off x="9331362" y="1085637"/>
+            <a:ext cx="1475588" cy="984279"/>
           </a:xfrm>
           <a:prstGeom prst="rect">
             <a:avLst/>
@@ -8115,8 +7938,8 @@
         </p:blipFill>
         <p:spPr>
           <a:xfrm>
-            <a:off x="10721940" y="340941"/>
-            <a:ext cx="1418308" cy="237252"/>
+            <a:off x="8943219" y="2027744"/>
+            <a:ext cx="2019492" cy="337817"/>
           </a:xfrm>
           <a:prstGeom prst="rect">
             <a:avLst/>
@@ -9035,507 +8858,6 @@
     <p:bg>
       <p:bgPr>
         <a:blipFill dpi="0" rotWithShape="1">
-          <a:blip r:embed="rId2">
-            <a:alphaModFix amt="86000"/>
-            <a:duotone>
-              <a:schemeClr val="bg2">
-                <a:shade val="76000"/>
-                <a:satMod val="180000"/>
-              </a:schemeClr>
-              <a:schemeClr val="bg2">
-                <a:tint val="80000"/>
-                <a:satMod val="120000"/>
-                <a:lumMod val="180000"/>
-              </a:schemeClr>
-            </a:duotone>
-            <a:lum/>
-          </a:blip>
-          <a:srcRect/>
-          <a:tile tx="0" ty="0" sx="100000" sy="100000" flip="none" algn="tl"/>
-        </a:blipFill>
-        <a:effectLst/>
-      </p:bgPr>
-    </p:bg>
-    <p:spTree>
-      <p:nvGrpSpPr>
-        <p:cNvPr id="1" name=""/>
-        <p:cNvGrpSpPr/>
-        <p:nvPr/>
-      </p:nvGrpSpPr>
-      <p:grpSpPr>
-        <a:xfrm>
-          <a:off x="0" y="0"/>
-          <a:ext cx="0" cy="0"/>
-          <a:chOff x="0" y="0"/>
-          <a:chExt cx="0" cy="0"/>
-        </a:xfrm>
-      </p:grpSpPr>
-      <p:sp useBgFill="1">
-        <p:nvSpPr>
-          <p:cNvPr id="18" name="Rectangle 17"/>
-          <p:cNvSpPr/>
-          <p:nvPr/>
-        </p:nvSpPr>
-        <p:spPr>
-          <a:xfrm>
-            <a:off x="0" y="-53172"/>
-            <a:ext cx="12092765" cy="7025471"/>
-          </a:xfrm>
-          <a:prstGeom prst="rect">
-            <a:avLst/>
-          </a:prstGeom>
-          <a:ln>
-            <a:noFill/>
-          </a:ln>
-        </p:spPr>
-        <p:style>
-          <a:lnRef idx="2">
-            <a:schemeClr val="accent1">
-              <a:shade val="50000"/>
-            </a:schemeClr>
-          </a:lnRef>
-          <a:fillRef idx="1">
-            <a:schemeClr val="accent1"/>
-          </a:fillRef>
-          <a:effectRef idx="0">
-            <a:schemeClr val="accent1"/>
-          </a:effectRef>
-          <a:fontRef idx="minor">
-            <a:schemeClr val="lt1"/>
-          </a:fontRef>
-        </p:style>
-        <p:txBody>
-          <a:bodyPr rtlCol="0" anchor="ctr"/>
-          <a:lstStyle/>
-          <a:p>
-            <a:pPr algn="ctr"/>
-            <a:endParaRPr lang="en-CA"/>
-          </a:p>
-        </p:txBody>
-      </p:sp>
-      <p:sp>
-        <p:nvSpPr>
-          <p:cNvPr id="2" name="Title 1"/>
-          <p:cNvSpPr>
-            <a:spLocks noGrp="1"/>
-          </p:cNvSpPr>
-          <p:nvPr>
-            <p:ph type="title"/>
-          </p:nvPr>
-        </p:nvSpPr>
-        <p:spPr>
-          <a:xfrm>
-            <a:off x="1484311" y="0"/>
-            <a:ext cx="10018713" cy="1752599"/>
-          </a:xfrm>
-        </p:spPr>
-        <p:txBody>
-          <a:bodyPr>
-            <a:normAutofit/>
-          </a:bodyPr>
-          <a:lstStyle/>
-          <a:p>
-            <a:r>
-              <a:rPr lang="en-CA" sz="5400" dirty="0"/>
-              <a:t>Methods Used</a:t>
-            </a:r>
-          </a:p>
-        </p:txBody>
-      </p:sp>
-      <p:pic>
-        <p:nvPicPr>
-          <p:cNvPr id="1030" name="Picture 6" descr="http://3.bp.blogspot.com/-tpjq61VsB8M/VDmrkLCMbyI/AAAAAAAAFeQ/c5yC893C9fg/s0/Logo%2BYelp.png"/>
-          <p:cNvPicPr>
-            <a:picLocks noChangeAspect="1" noChangeArrowheads="1"/>
-          </p:cNvPicPr>
-          <p:nvPr/>
-        </p:nvPicPr>
-        <p:blipFill>
-          <a:blip r:embed="rId3">
-            <a:extLst>
-              <a:ext uri="{28A0092B-C50C-407E-A947-70E740481C1C}">
-                <a14:useLocalDpi xmlns:a14="http://schemas.microsoft.com/office/drawing/2010/main" val="0"/>
-              </a:ext>
-            </a:extLst>
-          </a:blip>
-          <a:srcRect/>
-          <a:stretch>
-            <a:fillRect/>
-          </a:stretch>
-        </p:blipFill>
-        <p:spPr bwMode="auto">
-          <a:xfrm>
-            <a:off x="9685620" y="88609"/>
-            <a:ext cx="1036320" cy="691269"/>
-          </a:xfrm>
-          <a:prstGeom prst="rect">
-            <a:avLst/>
-          </a:prstGeom>
-          <a:noFill/>
-          <a:extLst>
-            <a:ext uri="{909E8E84-426E-40DD-AFC4-6F175D3DCCD1}">
-              <a14:hiddenFill xmlns:a14="http://schemas.microsoft.com/office/drawing/2010/main">
-                <a:solidFill>
-                  <a:srgbClr val="FFFFFF"/>
-                </a:solidFill>
-              </a14:hiddenFill>
-            </a:ext>
-          </a:extLst>
-        </p:spPr>
-      </p:pic>
-      <p:pic>
-        <p:nvPicPr>
-          <p:cNvPr id="8" name="Picture 7"/>
-          <p:cNvPicPr>
-            <a:picLocks noChangeAspect="1"/>
-          </p:cNvPicPr>
-          <p:nvPr/>
-        </p:nvPicPr>
-        <p:blipFill>
-          <a:blip r:embed="rId4">
-            <a:extLst>
-              <a:ext uri="{28A0092B-C50C-407E-A947-70E740481C1C}">
-                <a14:useLocalDpi xmlns:a14="http://schemas.microsoft.com/office/drawing/2010/main" val="0"/>
-              </a:ext>
-            </a:extLst>
-          </a:blip>
-          <a:stretch>
-            <a:fillRect/>
-          </a:stretch>
-        </p:blipFill>
-        <p:spPr>
-          <a:xfrm>
-            <a:off x="10721940" y="340941"/>
-            <a:ext cx="1418308" cy="237252"/>
-          </a:xfrm>
-          <a:prstGeom prst="rect">
-            <a:avLst/>
-          </a:prstGeom>
-        </p:spPr>
-      </p:pic>
-      <p:sp>
-        <p:nvSpPr>
-          <p:cNvPr id="15" name="Content Placeholder 7"/>
-          <p:cNvSpPr txBox="1">
-            <a:spLocks/>
-          </p:cNvSpPr>
-          <p:nvPr/>
-        </p:nvSpPr>
-        <p:spPr>
-          <a:xfrm>
-            <a:off x="1484310" y="1752599"/>
-            <a:ext cx="10018713" cy="3124201"/>
-          </a:xfrm>
-          <a:prstGeom prst="rect">
-            <a:avLst/>
-          </a:prstGeom>
-        </p:spPr>
-        <p:txBody>
-          <a:bodyPr vert="horz" lIns="91440" tIns="45720" rIns="91440" bIns="45720" rtlCol="0" anchor="t">
-            <a:normAutofit/>
-          </a:bodyPr>
-          <a:lstStyle>
-            <a:lvl1pPr marL="285750" indent="-285750" algn="l" defTabSz="457200" rtl="0" eaLnBrk="1" latinLnBrk="0" hangingPunct="1">
-              <a:spcBef>
-                <a:spcPct val="20000"/>
-              </a:spcBef>
-              <a:spcAft>
-                <a:spcPts val="600"/>
-              </a:spcAft>
-              <a:buClr>
-                <a:schemeClr val="accent1">
-                  <a:lumMod val="75000"/>
-                </a:schemeClr>
-              </a:buClr>
-              <a:buSzPct val="145000"/>
-              <a:buFont typeface="Arial"/>
-              <a:buChar char="•"/>
-              <a:defRPr sz="2400" kern="1200" cap="none">
-                <a:solidFill>
-                  <a:schemeClr val="tx1"/>
-                </a:solidFill>
-                <a:effectLst/>
-                <a:latin typeface="+mn-lt"/>
-                <a:ea typeface="+mn-ea"/>
-                <a:cs typeface="+mn-cs"/>
-              </a:defRPr>
-            </a:lvl1pPr>
-            <a:lvl2pPr marL="742950" indent="-285750" algn="l" defTabSz="457200" rtl="0" eaLnBrk="1" latinLnBrk="0" hangingPunct="1">
-              <a:spcBef>
-                <a:spcPct val="20000"/>
-              </a:spcBef>
-              <a:spcAft>
-                <a:spcPts val="600"/>
-              </a:spcAft>
-              <a:buClr>
-                <a:schemeClr val="accent1">
-                  <a:lumMod val="75000"/>
-                </a:schemeClr>
-              </a:buClr>
-              <a:buSzPct val="145000"/>
-              <a:buFont typeface="Arial"/>
-              <a:buChar char="•"/>
-              <a:defRPr sz="2000" kern="1200" cap="none">
-                <a:solidFill>
-                  <a:schemeClr val="tx1"/>
-                </a:solidFill>
-                <a:effectLst/>
-                <a:latin typeface="+mn-lt"/>
-                <a:ea typeface="+mn-ea"/>
-                <a:cs typeface="+mn-cs"/>
-              </a:defRPr>
-            </a:lvl2pPr>
-            <a:lvl3pPr marL="1200150" indent="-285750" algn="l" defTabSz="457200" rtl="0" eaLnBrk="1" latinLnBrk="0" hangingPunct="1">
-              <a:spcBef>
-                <a:spcPct val="20000"/>
-              </a:spcBef>
-              <a:spcAft>
-                <a:spcPts val="600"/>
-              </a:spcAft>
-              <a:buClr>
-                <a:schemeClr val="accent1">
-                  <a:lumMod val="75000"/>
-                </a:schemeClr>
-              </a:buClr>
-              <a:buSzPct val="145000"/>
-              <a:buFont typeface="Arial"/>
-              <a:buChar char="•"/>
-              <a:defRPr sz="1800" kern="1200" cap="none">
-                <a:solidFill>
-                  <a:schemeClr val="tx1"/>
-                </a:solidFill>
-                <a:effectLst/>
-                <a:latin typeface="+mn-lt"/>
-                <a:ea typeface="+mn-ea"/>
-                <a:cs typeface="+mn-cs"/>
-              </a:defRPr>
-            </a:lvl3pPr>
-            <a:lvl4pPr marL="1543050" indent="-171450" algn="l" defTabSz="457200" rtl="0" eaLnBrk="1" latinLnBrk="0" hangingPunct="1">
-              <a:spcBef>
-                <a:spcPct val="20000"/>
-              </a:spcBef>
-              <a:spcAft>
-                <a:spcPts val="600"/>
-              </a:spcAft>
-              <a:buClr>
-                <a:schemeClr val="accent1">
-                  <a:lumMod val="75000"/>
-                </a:schemeClr>
-              </a:buClr>
-              <a:buSzPct val="145000"/>
-              <a:buFont typeface="Arial"/>
-              <a:buChar char="•"/>
-              <a:defRPr sz="1600" kern="1200" cap="none">
-                <a:solidFill>
-                  <a:schemeClr val="tx1"/>
-                </a:solidFill>
-                <a:effectLst/>
-                <a:latin typeface="+mn-lt"/>
-                <a:ea typeface="+mn-ea"/>
-                <a:cs typeface="+mn-cs"/>
-              </a:defRPr>
-            </a:lvl4pPr>
-            <a:lvl5pPr marL="2000250" indent="-171450" algn="l" defTabSz="457200" rtl="0" eaLnBrk="1" latinLnBrk="0" hangingPunct="1">
-              <a:spcBef>
-                <a:spcPct val="20000"/>
-              </a:spcBef>
-              <a:spcAft>
-                <a:spcPts val="600"/>
-              </a:spcAft>
-              <a:buClr>
-                <a:schemeClr val="accent1">
-                  <a:lumMod val="75000"/>
-                </a:schemeClr>
-              </a:buClr>
-              <a:buSzPct val="145000"/>
-              <a:buFont typeface="Arial"/>
-              <a:buChar char="•"/>
-              <a:defRPr sz="1400" kern="1200" cap="none">
-                <a:solidFill>
-                  <a:schemeClr val="tx1"/>
-                </a:solidFill>
-                <a:effectLst/>
-                <a:latin typeface="+mn-lt"/>
-                <a:ea typeface="+mn-ea"/>
-                <a:cs typeface="+mn-cs"/>
-              </a:defRPr>
-            </a:lvl5pPr>
-            <a:lvl6pPr marL="2514600" indent="-228600" algn="l" defTabSz="457200" rtl="0" eaLnBrk="1" latinLnBrk="0" hangingPunct="1">
-              <a:spcBef>
-                <a:spcPct val="20000"/>
-              </a:spcBef>
-              <a:spcAft>
-                <a:spcPts val="600"/>
-              </a:spcAft>
-              <a:buClr>
-                <a:schemeClr val="accent1">
-                  <a:lumMod val="75000"/>
-                </a:schemeClr>
-              </a:buClr>
-              <a:buSzPct val="145000"/>
-              <a:buFont typeface="Arial"/>
-              <a:buChar char="•"/>
-              <a:defRPr sz="1400" kern="1200" cap="none">
-                <a:solidFill>
-                  <a:schemeClr val="tx1"/>
-                </a:solidFill>
-                <a:effectLst/>
-                <a:latin typeface="+mn-lt"/>
-                <a:ea typeface="+mn-ea"/>
-                <a:cs typeface="+mn-cs"/>
-              </a:defRPr>
-            </a:lvl6pPr>
-            <a:lvl7pPr marL="2971800" indent="-228600" algn="l" defTabSz="457200" rtl="0" eaLnBrk="1" latinLnBrk="0" hangingPunct="1">
-              <a:spcBef>
-                <a:spcPct val="20000"/>
-              </a:spcBef>
-              <a:spcAft>
-                <a:spcPts val="600"/>
-              </a:spcAft>
-              <a:buClr>
-                <a:schemeClr val="accent1">
-                  <a:lumMod val="75000"/>
-                </a:schemeClr>
-              </a:buClr>
-              <a:buSzPct val="145000"/>
-              <a:buFont typeface="Arial"/>
-              <a:buChar char="•"/>
-              <a:defRPr sz="1400" kern="1200" cap="none">
-                <a:solidFill>
-                  <a:schemeClr val="tx1"/>
-                </a:solidFill>
-                <a:effectLst/>
-                <a:latin typeface="+mn-lt"/>
-                <a:ea typeface="+mn-ea"/>
-                <a:cs typeface="+mn-cs"/>
-              </a:defRPr>
-            </a:lvl7pPr>
-            <a:lvl8pPr marL="3429000" indent="-228600" algn="l" defTabSz="457200" rtl="0" eaLnBrk="1" latinLnBrk="0" hangingPunct="1">
-              <a:spcBef>
-                <a:spcPct val="20000"/>
-              </a:spcBef>
-              <a:spcAft>
-                <a:spcPts val="600"/>
-              </a:spcAft>
-              <a:buClr>
-                <a:schemeClr val="accent1">
-                  <a:lumMod val="75000"/>
-                </a:schemeClr>
-              </a:buClr>
-              <a:buSzPct val="145000"/>
-              <a:buFont typeface="Arial"/>
-              <a:buChar char="•"/>
-              <a:defRPr sz="1400" kern="1200" cap="none">
-                <a:solidFill>
-                  <a:schemeClr val="tx1"/>
-                </a:solidFill>
-                <a:effectLst/>
-                <a:latin typeface="+mn-lt"/>
-                <a:ea typeface="+mn-ea"/>
-                <a:cs typeface="+mn-cs"/>
-              </a:defRPr>
-            </a:lvl8pPr>
-            <a:lvl9pPr marL="3886200" indent="-228600" algn="l" defTabSz="457200" rtl="0" eaLnBrk="1" latinLnBrk="0" hangingPunct="1">
-              <a:spcBef>
-                <a:spcPct val="20000"/>
-              </a:spcBef>
-              <a:spcAft>
-                <a:spcPts val="600"/>
-              </a:spcAft>
-              <a:buClr>
-                <a:schemeClr val="accent1">
-                  <a:lumMod val="75000"/>
-                </a:schemeClr>
-              </a:buClr>
-              <a:buSzPct val="145000"/>
-              <a:buFont typeface="Arial"/>
-              <a:buChar char="•"/>
-              <a:defRPr sz="1400" kern="1200" cap="none">
-                <a:solidFill>
-                  <a:schemeClr val="tx1"/>
-                </a:solidFill>
-                <a:effectLst/>
-                <a:latin typeface="+mn-lt"/>
-                <a:ea typeface="+mn-ea"/>
-                <a:cs typeface="+mn-cs"/>
-              </a:defRPr>
-            </a:lvl9pPr>
-          </a:lstStyle>
-          <a:p>
-            <a:r>
-              <a:rPr lang="en-CA" sz="3600" dirty="0"/>
-              <a:t>The most useful 3 lines of code:</a:t>
-            </a:r>
-          </a:p>
-        </p:txBody>
-      </p:sp>
-      <p:pic>
-        <p:nvPicPr>
-          <p:cNvPr id="16" name="Picture 15"/>
-          <p:cNvPicPr>
-            <a:picLocks noChangeAspect="1"/>
-          </p:cNvPicPr>
-          <p:nvPr/>
-        </p:nvPicPr>
-        <p:blipFill>
-          <a:blip r:embed="rId5"/>
-          <a:stretch>
-            <a:fillRect/>
-          </a:stretch>
-        </p:blipFill>
-        <p:spPr>
-          <a:xfrm>
-            <a:off x="172403" y="5192782"/>
-            <a:ext cx="11638598" cy="487845"/>
-          </a:xfrm>
-          <a:prstGeom prst="rect">
-            <a:avLst/>
-          </a:prstGeom>
-        </p:spPr>
-      </p:pic>
-      <p:pic>
-        <p:nvPicPr>
-          <p:cNvPr id="19" name="Picture 18"/>
-          <p:cNvPicPr>
-            <a:picLocks noChangeAspect="1"/>
-          </p:cNvPicPr>
-          <p:nvPr/>
-        </p:nvPicPr>
-        <p:blipFill>
-          <a:blip r:embed="rId6"/>
-          <a:stretch>
-            <a:fillRect/>
-          </a:stretch>
-        </p:blipFill>
-        <p:spPr>
-          <a:xfrm>
-            <a:off x="2669769" y="3314698"/>
-            <a:ext cx="6753225" cy="1085850"/>
-          </a:xfrm>
-          <a:prstGeom prst="rect">
-            <a:avLst/>
-          </a:prstGeom>
-        </p:spPr>
-      </p:pic>
-    </p:spTree>
-    <p:extLst>
-      <p:ext uri="{BB962C8B-B14F-4D97-AF65-F5344CB8AC3E}">
-        <p14:creationId xmlns:p14="http://schemas.microsoft.com/office/powerpoint/2010/main" val="3857343115"/>
-      </p:ext>
-    </p:extLst>
-  </p:cSld>
-  <p:clrMapOvr>
-    <a:masterClrMapping/>
-  </p:clrMapOvr>
-</p:sld>
-</file>
-
-<file path=ppt/slides/slide7.xml><?xml version="1.0" encoding="utf-8"?>
-<p:sld xmlns:a="http://schemas.openxmlformats.org/drawingml/2006/main" xmlns:r="http://schemas.openxmlformats.org/officeDocument/2006/relationships" xmlns:p="http://schemas.openxmlformats.org/presentationml/2006/main">
-  <p:cSld>
-    <p:bg>
-      <p:bgPr>
-        <a:blipFill dpi="0" rotWithShape="1">
           <a:blip r:embed="rId3">
             <a:alphaModFix amt="86000"/>
             <a:duotone>
@@ -10068,7 +9390,7 @@
 </p:sld>
 </file>
 
-<file path=ppt/slides/slide8.xml><?xml version="1.0" encoding="utf-8"?>
+<file path=ppt/slides/slide7.xml><?xml version="1.0" encoding="utf-8"?>
 <p:sld xmlns:a="http://schemas.openxmlformats.org/drawingml/2006/main" xmlns:r="http://schemas.openxmlformats.org/officeDocument/2006/relationships" xmlns:p="http://schemas.openxmlformats.org/presentationml/2006/main">
   <p:cSld>
     <p:bg>
@@ -11473,7 +10795,7 @@
 </p:sld>
 </file>
 
-<file path=ppt/slides/slide9.xml><?xml version="1.0" encoding="utf-8"?>
+<file path=ppt/slides/slide8.xml><?xml version="1.0" encoding="utf-8"?>
 <p:sld xmlns:a="http://schemas.openxmlformats.org/drawingml/2006/main" xmlns:r="http://schemas.openxmlformats.org/officeDocument/2006/relationships" xmlns:p="http://schemas.openxmlformats.org/presentationml/2006/main">
   <p:cSld>
     <p:spTree>
@@ -11995,6 +11317,226 @@
     <p:extLst>
       <p:ext uri="{BB962C8B-B14F-4D97-AF65-F5344CB8AC3E}">
         <p14:creationId xmlns:p14="http://schemas.microsoft.com/office/powerpoint/2010/main" val="2251939759"/>
+      </p:ext>
+    </p:extLst>
+  </p:cSld>
+  <p:clrMapOvr>
+    <a:masterClrMapping/>
+  </p:clrMapOvr>
+</p:sld>
+</file>
+
+<file path=ppt/slides/slide9.xml><?xml version="1.0" encoding="utf-8"?>
+<p:sld xmlns:a="http://schemas.openxmlformats.org/drawingml/2006/main" xmlns:r="http://schemas.openxmlformats.org/officeDocument/2006/relationships" xmlns:p="http://schemas.openxmlformats.org/presentationml/2006/main">
+  <p:cSld>
+    <p:spTree>
+      <p:nvGrpSpPr>
+        <p:cNvPr id="1" name=""/>
+        <p:cNvGrpSpPr/>
+        <p:nvPr/>
+      </p:nvGrpSpPr>
+      <p:grpSpPr>
+        <a:xfrm>
+          <a:off x="0" y="0"/>
+          <a:ext cx="0" cy="0"/>
+          <a:chOff x="0" y="0"/>
+          <a:chExt cx="0" cy="0"/>
+        </a:xfrm>
+      </p:grpSpPr>
+      <p:sp>
+        <p:nvSpPr>
+          <p:cNvPr id="2" name="Title 1"/>
+          <p:cNvSpPr>
+            <a:spLocks noGrp="1"/>
+          </p:cNvSpPr>
+          <p:nvPr>
+            <p:ph type="title"/>
+          </p:nvPr>
+        </p:nvSpPr>
+        <p:spPr>
+          <a:xfrm>
+            <a:off x="1484311" y="0"/>
+            <a:ext cx="10018713" cy="1752599"/>
+          </a:xfrm>
+        </p:spPr>
+        <p:txBody>
+          <a:bodyPr>
+            <a:normAutofit/>
+          </a:bodyPr>
+          <a:lstStyle/>
+          <a:p>
+            <a:r>
+              <a:rPr lang="en-CA" sz="5400" dirty="0"/>
+              <a:t>Challenges</a:t>
+            </a:r>
+          </a:p>
+        </p:txBody>
+      </p:sp>
+      <p:sp>
+        <p:nvSpPr>
+          <p:cNvPr id="8" name="Content Placeholder 7"/>
+          <p:cNvSpPr>
+            <a:spLocks noGrp="1"/>
+          </p:cNvSpPr>
+          <p:nvPr>
+            <p:ph idx="1"/>
+          </p:nvPr>
+        </p:nvSpPr>
+        <p:spPr>
+          <a:xfrm>
+            <a:off x="1484310" y="1752599"/>
+            <a:ext cx="10018713" cy="3863332"/>
+          </a:xfrm>
+        </p:spPr>
+        <p:txBody>
+          <a:bodyPr anchor="t">
+            <a:normAutofit/>
+          </a:bodyPr>
+          <a:lstStyle/>
+          <a:p>
+            <a:endParaRPr lang="en-CA" sz="3600" dirty="0"/>
+          </a:p>
+          <a:p>
+            <a:r>
+              <a:rPr lang="en-CA" sz="3600" dirty="0"/>
+              <a:t>Manipulating </a:t>
+            </a:r>
+            <a:r>
+              <a:rPr lang="en-CA" sz="3600" dirty="0" err="1"/>
+              <a:t>dataframes</a:t>
+            </a:r>
+            <a:endParaRPr lang="en-CA" sz="3600" dirty="0"/>
+          </a:p>
+          <a:p>
+            <a:endParaRPr lang="en-CA" sz="3600" dirty="0"/>
+          </a:p>
+          <a:p>
+            <a:r>
+              <a:rPr lang="en-CA" sz="3600" dirty="0"/>
+              <a:t>Watching for typos (API query parameters)</a:t>
+            </a:r>
+          </a:p>
+          <a:p>
+            <a:endParaRPr lang="en-CA" sz="3600" dirty="0"/>
+          </a:p>
+        </p:txBody>
+      </p:sp>
+      <p:pic>
+        <p:nvPicPr>
+          <p:cNvPr id="6146" name="Picture 2" descr="https://clipground.com/images/confused-emoji-png-15.png"/>
+          <p:cNvPicPr>
+            <a:picLocks noChangeAspect="1" noChangeArrowheads="1"/>
+          </p:cNvPicPr>
+          <p:nvPr/>
+        </p:nvPicPr>
+        <p:blipFill>
+          <a:blip r:embed="rId3">
+            <a:extLst>
+              <a:ext uri="{28A0092B-C50C-407E-A947-70E740481C1C}">
+                <a14:useLocalDpi xmlns:a14="http://schemas.microsoft.com/office/drawing/2010/main" val="0"/>
+              </a:ext>
+            </a:extLst>
+          </a:blip>
+          <a:srcRect/>
+          <a:stretch>
+            <a:fillRect/>
+          </a:stretch>
+        </p:blipFill>
+        <p:spPr bwMode="auto">
+          <a:xfrm>
+            <a:off x="10604314" y="5615931"/>
+            <a:ext cx="1013468" cy="1013468"/>
+          </a:xfrm>
+          <a:prstGeom prst="rect">
+            <a:avLst/>
+          </a:prstGeom>
+          <a:noFill/>
+          <a:extLst>
+            <a:ext uri="{909E8E84-426E-40DD-AFC4-6F175D3DCCD1}">
+              <a14:hiddenFill xmlns:a14="http://schemas.microsoft.com/office/drawing/2010/main">
+                <a:solidFill>
+                  <a:srgbClr val="FFFFFF"/>
+                </a:solidFill>
+              </a14:hiddenFill>
+            </a:ext>
+          </a:extLst>
+        </p:spPr>
+      </p:pic>
+      <p:pic>
+        <p:nvPicPr>
+          <p:cNvPr id="5" name="Picture 6" descr="http://3.bp.blogspot.com/-tpjq61VsB8M/VDmrkLCMbyI/AAAAAAAAFeQ/c5yC893C9fg/s0/Logo%2BYelp.png"/>
+          <p:cNvPicPr>
+            <a:picLocks noChangeAspect="1" noChangeArrowheads="1"/>
+          </p:cNvPicPr>
+          <p:nvPr/>
+        </p:nvPicPr>
+        <p:blipFill>
+          <a:blip r:embed="rId4">
+            <a:extLst>
+              <a:ext uri="{28A0092B-C50C-407E-A947-70E740481C1C}">
+                <a14:useLocalDpi xmlns:a14="http://schemas.microsoft.com/office/drawing/2010/main" val="0"/>
+              </a:ext>
+            </a:extLst>
+          </a:blip>
+          <a:srcRect/>
+          <a:stretch>
+            <a:fillRect/>
+          </a:stretch>
+        </p:blipFill>
+        <p:spPr bwMode="auto">
+          <a:xfrm>
+            <a:off x="9685620" y="88609"/>
+            <a:ext cx="1036320" cy="691269"/>
+          </a:xfrm>
+          <a:prstGeom prst="rect">
+            <a:avLst/>
+          </a:prstGeom>
+          <a:noFill/>
+          <a:extLst>
+            <a:ext uri="{909E8E84-426E-40DD-AFC4-6F175D3DCCD1}">
+              <a14:hiddenFill xmlns:a14="http://schemas.microsoft.com/office/drawing/2010/main">
+                <a:solidFill>
+                  <a:srgbClr val="FFFFFF"/>
+                </a:solidFill>
+              </a14:hiddenFill>
+            </a:ext>
+          </a:extLst>
+        </p:spPr>
+      </p:pic>
+      <p:pic>
+        <p:nvPicPr>
+          <p:cNvPr id="6" name="Picture 5"/>
+          <p:cNvPicPr>
+            <a:picLocks noChangeAspect="1"/>
+          </p:cNvPicPr>
+          <p:nvPr/>
+        </p:nvPicPr>
+        <p:blipFill>
+          <a:blip r:embed="rId5">
+            <a:extLst>
+              <a:ext uri="{28A0092B-C50C-407E-A947-70E740481C1C}">
+                <a14:useLocalDpi xmlns:a14="http://schemas.microsoft.com/office/drawing/2010/main" val="0"/>
+              </a:ext>
+            </a:extLst>
+          </a:blip>
+          <a:stretch>
+            <a:fillRect/>
+          </a:stretch>
+        </p:blipFill>
+        <p:spPr>
+          <a:xfrm>
+            <a:off x="10721940" y="340941"/>
+            <a:ext cx="1418308" cy="237252"/>
+          </a:xfrm>
+          <a:prstGeom prst="rect">
+            <a:avLst/>
+          </a:prstGeom>
+        </p:spPr>
+      </p:pic>
+    </p:spTree>
+    <p:extLst>
+      <p:ext uri="{BB962C8B-B14F-4D97-AF65-F5344CB8AC3E}">
+        <p14:creationId xmlns:p14="http://schemas.microsoft.com/office/powerpoint/2010/main" val="1960209316"/>
       </p:ext>
     </p:extLst>
   </p:cSld>

</xml_diff>